<commit_message>
add some details to powerpoint
</commit_message>
<xml_diff>
--- a/presentation.pptx
+++ b/presentation.pptx
@@ -3550,7 +3550,7 @@
           <a:p>
             <a:fld id="{48A87A34-81AB-432B-8DAE-1953F412C126}" type="datetimeFigureOut">
               <a:rPr lang="en-US" dirty="0"/>
-              <a:t>12/13/2025</a:t>
+              <a:t>12/14/2025</a:t>
             </a:fld>
             <a:endParaRPr lang="en-US" dirty="0"/>
           </a:p>
@@ -3812,7 +3812,7 @@
           <a:p>
             <a:fld id="{48A87A34-81AB-432B-8DAE-1953F412C126}" type="datetimeFigureOut">
               <a:rPr lang="en-US" dirty="0"/>
-              <a:t>12/13/2025</a:t>
+              <a:t>12/14/2025</a:t>
             </a:fld>
             <a:endParaRPr lang="en-US" dirty="0"/>
           </a:p>
@@ -4039,7 +4039,7 @@
             <a:fld id="{48A87A34-81AB-432B-8DAE-1953F412C126}" type="datetimeFigureOut">
               <a:rPr lang="en-US" dirty="0"/>
               <a:pPr/>
-              <a:t>12/13/2025</a:t>
+              <a:t>12/14/2025</a:t>
             </a:fld>
             <a:endParaRPr lang="en-US" dirty="0"/>
           </a:p>
@@ -4345,7 +4345,7 @@
             <a:fld id="{48A87A34-81AB-432B-8DAE-1953F412C126}" type="datetimeFigureOut">
               <a:rPr lang="en-US" dirty="0"/>
               <a:pPr/>
-              <a:t>12/13/2025</a:t>
+              <a:t>12/14/2025</a:t>
             </a:fld>
             <a:endParaRPr lang="en-US" dirty="0"/>
           </a:p>
@@ -4814,7 +4814,7 @@
             <a:fld id="{48A87A34-81AB-432B-8DAE-1953F412C126}" type="datetimeFigureOut">
               <a:rPr lang="en-US" dirty="0"/>
               <a:pPr/>
-              <a:t>12/13/2025</a:t>
+              <a:t>12/14/2025</a:t>
             </a:fld>
             <a:endParaRPr lang="en-US" dirty="0"/>
           </a:p>
@@ -5356,7 +5356,7 @@
           <a:p>
             <a:fld id="{48A87A34-81AB-432B-8DAE-1953F412C126}" type="datetimeFigureOut">
               <a:rPr lang="en-US" dirty="0"/>
-              <a:t>12/13/2025</a:t>
+              <a:t>12/14/2025</a:t>
             </a:fld>
             <a:endParaRPr lang="en-US" dirty="0"/>
           </a:p>
@@ -6125,7 +6125,7 @@
           <a:p>
             <a:fld id="{48A87A34-81AB-432B-8DAE-1953F412C126}" type="datetimeFigureOut">
               <a:rPr lang="en-US" dirty="0"/>
-              <a:t>12/13/2025</a:t>
+              <a:t>12/14/2025</a:t>
             </a:fld>
             <a:endParaRPr lang="en-US" dirty="0"/>
           </a:p>
@@ -6295,7 +6295,7 @@
           <a:p>
             <a:fld id="{48A87A34-81AB-432B-8DAE-1953F412C126}" type="datetimeFigureOut">
               <a:rPr lang="en-US" dirty="0"/>
-              <a:t>12/13/2025</a:t>
+              <a:t>12/14/2025</a:t>
             </a:fld>
             <a:endParaRPr lang="en-US" dirty="0"/>
           </a:p>
@@ -6514,7 +6514,7 @@
             <a:fld id="{48A87A34-81AB-432B-8DAE-1953F412C126}" type="datetimeFigureOut">
               <a:rPr lang="en-US" dirty="0"/>
               <a:pPr/>
-              <a:t>12/13/2025</a:t>
+              <a:t>12/14/2025</a:t>
             </a:fld>
             <a:endParaRPr lang="en-US" dirty="0"/>
           </a:p>
@@ -6689,7 +6689,7 @@
           <a:p>
             <a:fld id="{48A87A34-81AB-432B-8DAE-1953F412C126}" type="datetimeFigureOut">
               <a:rPr lang="en-US" dirty="0"/>
-              <a:t>12/13/2025</a:t>
+              <a:t>12/14/2025</a:t>
             </a:fld>
             <a:endParaRPr lang="en-US" dirty="0"/>
           </a:p>
@@ -6974,7 +6974,7 @@
             <a:fld id="{48A87A34-81AB-432B-8DAE-1953F412C126}" type="datetimeFigureOut">
               <a:rPr lang="en-US" dirty="0"/>
               <a:pPr/>
-              <a:t>12/13/2025</a:t>
+              <a:t>12/14/2025</a:t>
             </a:fld>
             <a:endParaRPr lang="en-US" dirty="0"/>
           </a:p>
@@ -7211,7 +7211,7 @@
           <a:p>
             <a:fld id="{48A87A34-81AB-432B-8DAE-1953F412C126}" type="datetimeFigureOut">
               <a:rPr lang="en-US" dirty="0"/>
-              <a:t>12/13/2025</a:t>
+              <a:t>12/14/2025</a:t>
             </a:fld>
             <a:endParaRPr lang="en-US" dirty="0"/>
           </a:p>
@@ -7585,7 +7585,7 @@
           <a:p>
             <a:fld id="{48A87A34-81AB-432B-8DAE-1953F412C126}" type="datetimeFigureOut">
               <a:rPr lang="en-US" dirty="0"/>
-              <a:t>12/13/2025</a:t>
+              <a:t>12/14/2025</a:t>
             </a:fld>
             <a:endParaRPr lang="en-US" dirty="0"/>
           </a:p>
@@ -7698,7 +7698,7 @@
           <a:p>
             <a:fld id="{48A87A34-81AB-432B-8DAE-1953F412C126}" type="datetimeFigureOut">
               <a:rPr lang="en-US" dirty="0"/>
-              <a:t>12/13/2025</a:t>
+              <a:t>12/14/2025</a:t>
             </a:fld>
             <a:endParaRPr lang="en-US" dirty="0"/>
           </a:p>
@@ -7788,7 +7788,7 @@
           <a:p>
             <a:fld id="{48A87A34-81AB-432B-8DAE-1953F412C126}" type="datetimeFigureOut">
               <a:rPr lang="en-US" dirty="0"/>
-              <a:t>12/13/2025</a:t>
+              <a:t>12/14/2025</a:t>
             </a:fld>
             <a:endParaRPr lang="en-US" dirty="0"/>
           </a:p>
@@ -8032,7 +8032,7 @@
           <a:p>
             <a:fld id="{48A87A34-81AB-432B-8DAE-1953F412C126}" type="datetimeFigureOut">
               <a:rPr lang="en-US" dirty="0"/>
-              <a:t>12/13/2025</a:t>
+              <a:t>12/14/2025</a:t>
             </a:fld>
             <a:endParaRPr lang="en-US" dirty="0"/>
           </a:p>
@@ -8284,7 +8284,7 @@
           <a:p>
             <a:fld id="{48A87A34-81AB-432B-8DAE-1953F412C126}" type="datetimeFigureOut">
               <a:rPr lang="en-US" dirty="0"/>
-              <a:t>12/13/2025</a:t>
+              <a:t>12/14/2025</a:t>
             </a:fld>
             <a:endParaRPr lang="en-US" dirty="0"/>
           </a:p>
@@ -8523,7 +8523,7 @@
             <a:fld id="{48A87A34-81AB-432B-8DAE-1953F412C126}" type="datetimeFigureOut">
               <a:rPr lang="en-US" dirty="0"/>
               <a:pPr/>
-              <a:t>12/13/2025</a:t>
+              <a:t>12/14/2025</a:t>
             </a:fld>
             <a:endParaRPr lang="en-US" dirty="0"/>
           </a:p>
@@ -13769,8 +13769,12 @@
           <a:p>
             <a:pPr algn="l"/>
             <a:r>
-              <a:rPr lang="en-US" sz="3200"/>
-              <a:t>Knowledge Base</a:t>
+              <a:rPr lang="en-US" sz="3200" dirty="0" err="1"/>
+              <a:t>dAta</a:t>
+            </a:r>
+            <a:r>
+              <a:rPr lang="en-US" sz="3200" dirty="0"/>
+              <a:t> Sources</a:t>
             </a:r>
           </a:p>
         </p:txBody>
@@ -14470,6 +14474,15 @@
 </file>
 
 <file path=customXml/item1.xml><?xml version="1.0" encoding="utf-8"?>
+<?mso-contentType ?>
+<FormTemplates xmlns="http://schemas.microsoft.com/sharepoint/v3/contenttype/forms">
+  <Display>DocumentLibraryForm</Display>
+  <Edit>DocumentLibraryForm</Edit>
+  <New>DocumentLibraryForm</New>
+</FormTemplates>
+</file>
+
+<file path=customXml/item2.xml><?xml version="1.0" encoding="utf-8"?>
 <ct:contentTypeSchema xmlns:ct="http://schemas.microsoft.com/office/2006/metadata/contentType" xmlns:ma="http://schemas.microsoft.com/office/2006/metadata/properties/metaAttributes" ct:_="" ma:_="" ma:contentTypeName="Document" ma:contentTypeID="0x0101000D7D17C762197B498A4D016DD479FFC0" ma:contentTypeVersion="4" ma:contentTypeDescription="Create a new document." ma:contentTypeScope="" ma:versionID="bbea2a0fd38620890d7f84a8be2718eb">
   <xsd:schema xmlns:xsd="http://www.w3.org/2001/XMLSchema" xmlns:xs="http://www.w3.org/2001/XMLSchema" xmlns:p="http://schemas.microsoft.com/office/2006/metadata/properties" xmlns:ns3="721fdc69-4437-415d-a2cf-9233b5cc6189" targetNamespace="http://schemas.microsoft.com/office/2006/metadata/properties" ma:root="true" ma:fieldsID="a59704dc04a574a4a748ba933f6bee55" ns3:_="">
     <xsd:import namespace="721fdc69-4437-415d-a2cf-9233b5cc6189"/>
@@ -14613,15 +14626,6 @@
 </ct:contentTypeSchema>
 </file>
 
-<file path=customXml/item2.xml><?xml version="1.0" encoding="utf-8"?>
-<?mso-contentType ?>
-<FormTemplates xmlns="http://schemas.microsoft.com/sharepoint/v3/contenttype/forms">
-  <Display>DocumentLibraryForm</Display>
-  <Edit>DocumentLibraryForm</Edit>
-  <New>DocumentLibraryForm</New>
-</FormTemplates>
-</file>
-
 <file path=customXml/item3.xml><?xml version="1.0" encoding="utf-8"?>
 <p:properties xmlns:p="http://schemas.microsoft.com/office/2006/metadata/properties" xmlns:xsi="http://www.w3.org/2001/XMLSchema-instance" xmlns:pc="http://schemas.microsoft.com/office/infopath/2007/PartnerControls">
   <documentManagement/>
@@ -14629,6 +14633,14 @@
 </file>
 
 <file path=customXml/itemProps1.xml><?xml version="1.0" encoding="utf-8"?>
+<ds:datastoreItem xmlns:ds="http://schemas.openxmlformats.org/officeDocument/2006/customXml" ds:itemID="{329D6C8E-F1CB-42E8-B317-7BADD88F9AC5}">
+  <ds:schemaRefs>
+    <ds:schemaRef ds:uri="http://schemas.microsoft.com/sharepoint/v3/contenttype/forms"/>
+  </ds:schemaRefs>
+</ds:datastoreItem>
+</file>
+
+<file path=customXml/itemProps2.xml><?xml version="1.0" encoding="utf-8"?>
 <ds:datastoreItem xmlns:ds="http://schemas.openxmlformats.org/officeDocument/2006/customXml" ds:itemID="{636ECC50-5E6F-4CB7-9DE7-BE2D04E9AF31}">
   <ds:schemaRefs>
     <ds:schemaRef ds:uri="http://schemas.microsoft.com/office/2006/metadata/contentType"/>
@@ -14642,14 +14654,6 @@
     <ds:schemaRef ds:uri="http://purl.org/dc/elements/1.1/"/>
     <ds:schemaRef ds:uri="http://purl.org/dc/terms/"/>
     <ds:schemaRef ds:uri="http://schemas.microsoft.com/internal/obd"/>
-  </ds:schemaRefs>
-</ds:datastoreItem>
-</file>
-
-<file path=customXml/itemProps2.xml><?xml version="1.0" encoding="utf-8"?>
-<ds:datastoreItem xmlns:ds="http://schemas.openxmlformats.org/officeDocument/2006/customXml" ds:itemID="{329D6C8E-F1CB-42E8-B317-7BADD88F9AC5}">
-  <ds:schemaRefs>
-    <ds:schemaRef ds:uri="http://schemas.microsoft.com/sharepoint/v3/contenttype/forms"/>
   </ds:schemaRefs>
 </ds:datastoreItem>
 </file>

</xml_diff>